<commit_message>
More tweaks. Is it Friday yet?
</commit_message>
<xml_diff>
--- a/Securing Your API Endpoints - CodeMash 2016.pptx
+++ b/Securing Your API Endpoints - CodeMash 2016.pptx
@@ -6603,29 +6603,6 @@
             </a:endParaRPr>
           </a:p>
           <a:p>
-            <a:r>
-              <a:rPr lang="en-US" sz="1200" kern="1200" baseline="0" dirty="0" smtClean="0">
-                <a:solidFill>
-                  <a:schemeClr val="tx1"/>
-                </a:solidFill>
-                <a:effectLst/>
-                <a:latin typeface="+mn-lt"/>
-                <a:ea typeface="+mn-ea"/>
-                <a:cs typeface="+mn-cs"/>
-              </a:rPr>
-              <a:t>* No message integrity</a:t>
-            </a:r>
-            <a:endParaRPr lang="en-US" sz="1200" kern="1200" baseline="0" dirty="0" smtClean="0">
-              <a:solidFill>
-                <a:schemeClr val="tx1"/>
-              </a:solidFill>
-              <a:effectLst/>
-              <a:latin typeface="+mn-lt"/>
-              <a:ea typeface="+mn-ea"/>
-              <a:cs typeface="+mn-cs"/>
-            </a:endParaRPr>
-          </a:p>
-          <a:p>
             <a:endParaRPr lang="en-US" sz="1200" kern="1200" baseline="0" dirty="0" smtClean="0">
               <a:solidFill>
                 <a:schemeClr val="tx1"/>
@@ -7040,8 +7017,29 @@
                 <a:ea typeface="+mn-ea"/>
                 <a:cs typeface="+mn-cs"/>
               </a:rPr>
-              <a:t> message, without requiring TLS to keep</a:t>
-            </a:r>
+              <a:t> message, </a:t>
+            </a:r>
+            <a:r>
+              <a:rPr lang="en-US" sz="1200" kern="1200" baseline="0" dirty="0" smtClean="0">
+                <a:solidFill>
+                  <a:schemeClr val="tx1"/>
+                </a:solidFill>
+                <a:effectLst/>
+                <a:latin typeface="+mn-lt"/>
+                <a:ea typeface="+mn-ea"/>
+                <a:cs typeface="+mn-cs"/>
+              </a:rPr>
+              <a:t>without TLS</a:t>
+            </a:r>
+            <a:endParaRPr lang="en-US" sz="1200" kern="1200" baseline="0" dirty="0" smtClean="0">
+              <a:solidFill>
+                <a:schemeClr val="tx1"/>
+              </a:solidFill>
+              <a:effectLst/>
+              <a:latin typeface="+mn-lt"/>
+              <a:ea typeface="+mn-ea"/>
+              <a:cs typeface="+mn-cs"/>
+            </a:endParaRPr>
           </a:p>
           <a:p>
             <a:pPr marL="0" indent="0">
@@ -8972,7 +8970,100 @@
                 <a:ea typeface="+mn-ea"/>
                 <a:cs typeface="+mn-cs"/>
               </a:rPr>
-              <a:t> it’s easy. Some person, likely a programmer, obtains the API key and secret value using some secure mechanism, such as logging into a secure website over SSL, and then puts it into the source code or </a:t>
+              <a:t> it’s easy. </a:t>
+            </a:r>
+            <a:endParaRPr lang="en-US" sz="1200" kern="1200" dirty="0" smtClean="0">
+              <a:solidFill>
+                <a:schemeClr val="tx1"/>
+              </a:solidFill>
+              <a:effectLst/>
+              <a:latin typeface="+mn-lt"/>
+              <a:ea typeface="+mn-ea"/>
+              <a:cs typeface="+mn-cs"/>
+            </a:endParaRPr>
+          </a:p>
+          <a:p>
+            <a:endParaRPr lang="en-US" sz="1200" kern="1200" dirty="0" smtClean="0">
+              <a:solidFill>
+                <a:schemeClr val="tx1"/>
+              </a:solidFill>
+              <a:effectLst/>
+              <a:latin typeface="+mn-lt"/>
+              <a:ea typeface="+mn-ea"/>
+              <a:cs typeface="+mn-cs"/>
+            </a:endParaRPr>
+          </a:p>
+          <a:p>
+            <a:r>
+              <a:rPr lang="en-US" sz="1200" kern="1200" dirty="0" smtClean="0">
+                <a:solidFill>
+                  <a:schemeClr val="tx1"/>
+                </a:solidFill>
+                <a:effectLst/>
+                <a:latin typeface="+mn-lt"/>
+                <a:ea typeface="+mn-ea"/>
+                <a:cs typeface="+mn-cs"/>
+              </a:rPr>
+              <a:t>* Programmer </a:t>
+            </a:r>
+            <a:r>
+              <a:rPr lang="en-US" sz="1200" kern="1200" dirty="0" smtClean="0">
+                <a:solidFill>
+                  <a:schemeClr val="tx1"/>
+                </a:solidFill>
+                <a:effectLst/>
+                <a:latin typeface="+mn-lt"/>
+                <a:ea typeface="+mn-ea"/>
+                <a:cs typeface="+mn-cs"/>
+              </a:rPr>
+              <a:t>obtains the API key and secret value using some secure </a:t>
+            </a:r>
+            <a:r>
+              <a:rPr lang="en-US" sz="1200" kern="1200" dirty="0" smtClean="0">
+                <a:solidFill>
+                  <a:schemeClr val="tx1"/>
+                </a:solidFill>
+                <a:effectLst/>
+                <a:latin typeface="+mn-lt"/>
+                <a:ea typeface="+mn-ea"/>
+                <a:cs typeface="+mn-cs"/>
+              </a:rPr>
+              <a:t>mechanism</a:t>
+            </a:r>
+            <a:br>
+              <a:rPr lang="en-US" sz="1200" kern="1200" dirty="0" smtClean="0">
+                <a:solidFill>
+                  <a:schemeClr val="tx1"/>
+                </a:solidFill>
+                <a:effectLst/>
+                <a:latin typeface="+mn-lt"/>
+                <a:ea typeface="+mn-ea"/>
+                <a:cs typeface="+mn-cs"/>
+              </a:rPr>
+            </a:br>
+            <a:r>
+              <a:rPr lang="en-US" sz="1200" kern="1200" dirty="0" smtClean="0">
+                <a:solidFill>
+                  <a:schemeClr val="tx1"/>
+                </a:solidFill>
+                <a:effectLst/>
+                <a:latin typeface="+mn-lt"/>
+                <a:ea typeface="+mn-ea"/>
+                <a:cs typeface="+mn-cs"/>
+              </a:rPr>
+              <a:t>* Puts </a:t>
+            </a:r>
+            <a:r>
+              <a:rPr lang="en-US" sz="1200" kern="1200" dirty="0" smtClean="0">
+                <a:solidFill>
+                  <a:schemeClr val="tx1"/>
+                </a:solidFill>
+                <a:effectLst/>
+                <a:latin typeface="+mn-lt"/>
+                <a:ea typeface="+mn-ea"/>
+                <a:cs typeface="+mn-cs"/>
+              </a:rPr>
+              <a:t>it into the source code or </a:t>
             </a:r>
             <a:r>
               <a:rPr lang="en-US" sz="1200" kern="1200" dirty="0" err="1" smtClean="0">
@@ -8996,7 +9087,66 @@
                 <a:ea typeface="+mn-ea"/>
                 <a:cs typeface="+mn-cs"/>
               </a:rPr>
-              <a:t> file for the client. Once set, it doesn’t need to change; that specific deployed instance of the client will only ever deal with that one pair of values. </a:t>
+              <a:t> file for the client. </a:t>
+            </a:r>
+            <a:endParaRPr lang="en-US" sz="1200" kern="1200" dirty="0" smtClean="0">
+              <a:solidFill>
+                <a:schemeClr val="tx1"/>
+              </a:solidFill>
+              <a:effectLst/>
+              <a:latin typeface="+mn-lt"/>
+              <a:ea typeface="+mn-ea"/>
+              <a:cs typeface="+mn-cs"/>
+            </a:endParaRPr>
+          </a:p>
+          <a:p>
+            <a:r>
+              <a:rPr lang="en-US" sz="1200" kern="1200" dirty="0" smtClean="0">
+                <a:solidFill>
+                  <a:schemeClr val="tx1"/>
+                </a:solidFill>
+                <a:effectLst/>
+                <a:latin typeface="+mn-lt"/>
+                <a:ea typeface="+mn-ea"/>
+                <a:cs typeface="+mn-cs"/>
+              </a:rPr>
+              <a:t>* Once </a:t>
+            </a:r>
+            <a:r>
+              <a:rPr lang="en-US" sz="1200" kern="1200" dirty="0" smtClean="0">
+                <a:solidFill>
+                  <a:schemeClr val="tx1"/>
+                </a:solidFill>
+                <a:effectLst/>
+                <a:latin typeface="+mn-lt"/>
+                <a:ea typeface="+mn-ea"/>
+                <a:cs typeface="+mn-cs"/>
+              </a:rPr>
+              <a:t>set, </a:t>
+            </a:r>
+            <a:r>
+              <a:rPr lang="en-US" sz="1200" kern="1200" dirty="0" smtClean="0">
+                <a:solidFill>
+                  <a:schemeClr val="tx1"/>
+                </a:solidFill>
+                <a:effectLst/>
+                <a:latin typeface="+mn-lt"/>
+                <a:ea typeface="+mn-ea"/>
+                <a:cs typeface="+mn-cs"/>
+              </a:rPr>
+              <a:t>doesn’t </a:t>
+            </a:r>
+            <a:r>
+              <a:rPr lang="en-US" sz="1200" kern="1200" dirty="0" smtClean="0">
+                <a:solidFill>
+                  <a:schemeClr val="tx1"/>
+                </a:solidFill>
+                <a:effectLst/>
+                <a:latin typeface="+mn-lt"/>
+                <a:ea typeface="+mn-ea"/>
+                <a:cs typeface="+mn-cs"/>
+              </a:rPr>
+              <a:t>need to change; that specific deployed instance of the client will only ever deal with that one pair of values. </a:t>
             </a:r>
           </a:p>
           <a:p>
@@ -9131,8 +9281,83 @@
                 <a:ea typeface="+mn-ea"/>
                 <a:cs typeface="+mn-cs"/>
               </a:rPr>
-              <a:t>No way to pre-load the key up front; users can log in from any browser at any time.</a:t>
-            </a:r>
+              <a:t>* No </a:t>
+            </a:r>
+            <a:r>
+              <a:rPr lang="en-US" sz="1200" kern="1200" baseline="0" dirty="0" smtClean="0">
+                <a:solidFill>
+                  <a:schemeClr val="tx1"/>
+                </a:solidFill>
+                <a:effectLst/>
+                <a:latin typeface="+mn-lt"/>
+                <a:ea typeface="+mn-ea"/>
+                <a:cs typeface="+mn-cs"/>
+              </a:rPr>
+              <a:t>way to pre-load the key up front; users can log in from any browser at any </a:t>
+            </a:r>
+            <a:r>
+              <a:rPr lang="en-US" sz="1200" kern="1200" baseline="0" dirty="0" smtClean="0">
+                <a:solidFill>
+                  <a:schemeClr val="tx1"/>
+                </a:solidFill>
+                <a:effectLst/>
+                <a:latin typeface="+mn-lt"/>
+                <a:ea typeface="+mn-ea"/>
+                <a:cs typeface="+mn-cs"/>
+              </a:rPr>
+              <a:t>time</a:t>
+            </a:r>
+          </a:p>
+          <a:p>
+            <a:r>
+              <a:rPr lang="en-US" sz="1200" kern="1200" baseline="0" dirty="0" smtClean="0">
+                <a:solidFill>
+                  <a:schemeClr val="tx1"/>
+                </a:solidFill>
+                <a:effectLst/>
+                <a:latin typeface="+mn-lt"/>
+                <a:ea typeface="+mn-ea"/>
+                <a:cs typeface="+mn-cs"/>
+              </a:rPr>
+              <a:t>* Example: PC in a computer lab</a:t>
+            </a:r>
+          </a:p>
+          <a:p>
+            <a:r>
+              <a:rPr lang="en-US" sz="1200" kern="1200" baseline="0" dirty="0" smtClean="0">
+                <a:solidFill>
+                  <a:schemeClr val="tx1"/>
+                </a:solidFill>
+                <a:effectLst/>
+                <a:latin typeface="+mn-lt"/>
+                <a:ea typeface="+mn-ea"/>
+                <a:cs typeface="+mn-cs"/>
+              </a:rPr>
+              <a:t>* Need a way to securely transmit secret key to browser BEFORE it makes signed requests</a:t>
+            </a:r>
+          </a:p>
+          <a:p>
+            <a:r>
+              <a:rPr lang="en-US" sz="1200" kern="1200" baseline="0" dirty="0" smtClean="0">
+                <a:solidFill>
+                  <a:schemeClr val="tx1"/>
+                </a:solidFill>
+                <a:effectLst/>
+                <a:latin typeface="+mn-lt"/>
+                <a:ea typeface="+mn-ea"/>
+                <a:cs typeface="+mn-cs"/>
+              </a:rPr>
+              <a:t>* Remove or expire key during logout</a:t>
+            </a:r>
+            <a:endParaRPr lang="en-US" sz="1200" kern="1200" baseline="0" dirty="0" smtClean="0">
+              <a:solidFill>
+                <a:schemeClr val="tx1"/>
+              </a:solidFill>
+              <a:effectLst/>
+              <a:latin typeface="+mn-lt"/>
+              <a:ea typeface="+mn-ea"/>
+              <a:cs typeface="+mn-cs"/>
+            </a:endParaRPr>
           </a:p>
           <a:p>
             <a:endParaRPr lang="en-US" sz="1200" kern="1200" dirty="0" smtClean="0">
@@ -9168,10 +9393,8 @@
                 <a:ea typeface="+mn-ea"/>
                 <a:cs typeface="+mn-cs"/>
               </a:rPr>
-              <a:t>, as you can see here. The browser or app collects the actual user password from the user and submits it as a POST over SSL. If the login is successful, the server returns a response that includes the key. The client then saves the key in memory or local storage of some kind. Now that the client has the key, subsequent requests can be made without SSL.</a:t>
-            </a:r>
-          </a:p>
-          <a:p>
+              <a:t>, as you can see here. </a:t>
+            </a:r>
             <a:endParaRPr lang="en-US" sz="1200" kern="1200" dirty="0" smtClean="0">
               <a:solidFill>
                 <a:schemeClr val="tx1"/>
@@ -9193,8 +9416,152 @@
                 <a:ea typeface="+mn-ea"/>
                 <a:cs typeface="+mn-cs"/>
               </a:rPr>
-              <a:t>When the user logs out, just delete the key from memory.</a:t>
-            </a:r>
+              <a:t>* Browser </a:t>
+            </a:r>
+            <a:r>
+              <a:rPr lang="en-US" sz="1200" kern="1200" dirty="0" smtClean="0">
+                <a:solidFill>
+                  <a:schemeClr val="tx1"/>
+                </a:solidFill>
+                <a:effectLst/>
+                <a:latin typeface="+mn-lt"/>
+                <a:ea typeface="+mn-ea"/>
+                <a:cs typeface="+mn-cs"/>
+              </a:rPr>
+              <a:t>or app collects the actual user password from the user and </a:t>
+            </a:r>
+            <a:r>
+              <a:rPr lang="en-US" sz="1200" kern="1200" dirty="0" smtClean="0">
+                <a:solidFill>
+                  <a:schemeClr val="tx1"/>
+                </a:solidFill>
+                <a:effectLst/>
+                <a:latin typeface="+mn-lt"/>
+                <a:ea typeface="+mn-ea"/>
+                <a:cs typeface="+mn-cs"/>
+              </a:rPr>
+              <a:t>POSTS it</a:t>
+            </a:r>
+          </a:p>
+          <a:p>
+            <a:r>
+              <a:rPr lang="en-US" sz="1200" kern="1200" dirty="0" smtClean="0">
+                <a:solidFill>
+                  <a:schemeClr val="tx1"/>
+                </a:solidFill>
+                <a:effectLst/>
+                <a:latin typeface="+mn-lt"/>
+                <a:ea typeface="+mn-ea"/>
+                <a:cs typeface="+mn-cs"/>
+              </a:rPr>
+              <a:t>* If successful</a:t>
+            </a:r>
+            <a:r>
+              <a:rPr lang="en-US" sz="1200" kern="1200" dirty="0" smtClean="0">
+                <a:solidFill>
+                  <a:schemeClr val="tx1"/>
+                </a:solidFill>
+                <a:effectLst/>
+                <a:latin typeface="+mn-lt"/>
+                <a:ea typeface="+mn-ea"/>
+                <a:cs typeface="+mn-cs"/>
+              </a:rPr>
+              <a:t>, </a:t>
+            </a:r>
+            <a:r>
+              <a:rPr lang="en-US" sz="1200" kern="1200" dirty="0" smtClean="0">
+                <a:solidFill>
+                  <a:schemeClr val="tx1"/>
+                </a:solidFill>
+                <a:effectLst/>
+                <a:latin typeface="+mn-lt"/>
+                <a:ea typeface="+mn-ea"/>
+                <a:cs typeface="+mn-cs"/>
+              </a:rPr>
+              <a:t>server </a:t>
+            </a:r>
+            <a:r>
+              <a:rPr lang="en-US" sz="1200" kern="1200" dirty="0" smtClean="0">
+                <a:solidFill>
+                  <a:schemeClr val="tx1"/>
+                </a:solidFill>
+                <a:effectLst/>
+                <a:latin typeface="+mn-lt"/>
+                <a:ea typeface="+mn-ea"/>
+                <a:cs typeface="+mn-cs"/>
+              </a:rPr>
+              <a:t>returns a response that includes the </a:t>
+            </a:r>
+            <a:r>
+              <a:rPr lang="en-US" sz="1200" kern="1200" dirty="0" smtClean="0">
+                <a:solidFill>
+                  <a:schemeClr val="tx1"/>
+                </a:solidFill>
+                <a:effectLst/>
+                <a:latin typeface="+mn-lt"/>
+                <a:ea typeface="+mn-ea"/>
+                <a:cs typeface="+mn-cs"/>
+              </a:rPr>
+              <a:t>key</a:t>
+            </a:r>
+          </a:p>
+          <a:p>
+            <a:r>
+              <a:rPr lang="en-US" sz="1200" kern="1200" dirty="0" smtClean="0">
+                <a:solidFill>
+                  <a:schemeClr val="tx1"/>
+                </a:solidFill>
+                <a:effectLst/>
+                <a:latin typeface="+mn-lt"/>
+                <a:ea typeface="+mn-ea"/>
+                <a:cs typeface="+mn-cs"/>
+              </a:rPr>
+              <a:t>* Client saves key </a:t>
+            </a:r>
+            <a:r>
+              <a:rPr lang="en-US" sz="1200" kern="1200" dirty="0" smtClean="0">
+                <a:solidFill>
+                  <a:schemeClr val="tx1"/>
+                </a:solidFill>
+                <a:effectLst/>
+                <a:latin typeface="+mn-lt"/>
+                <a:ea typeface="+mn-ea"/>
+                <a:cs typeface="+mn-cs"/>
+              </a:rPr>
+              <a:t>in memory or local </a:t>
+            </a:r>
+            <a:r>
+              <a:rPr lang="en-US" sz="1200" kern="1200" dirty="0" smtClean="0">
+                <a:solidFill>
+                  <a:schemeClr val="tx1"/>
+                </a:solidFill>
+                <a:effectLst/>
+                <a:latin typeface="+mn-lt"/>
+                <a:ea typeface="+mn-ea"/>
+                <a:cs typeface="+mn-cs"/>
+              </a:rPr>
+              <a:t>storage</a:t>
+            </a:r>
+            <a:endParaRPr lang="en-US" sz="1200" kern="1200" dirty="0" smtClean="0">
+              <a:solidFill>
+                <a:schemeClr val="tx1"/>
+              </a:solidFill>
+              <a:effectLst/>
+              <a:latin typeface="+mn-lt"/>
+              <a:ea typeface="+mn-ea"/>
+              <a:cs typeface="+mn-cs"/>
+            </a:endParaRPr>
+          </a:p>
+          <a:p>
+            <a:endParaRPr lang="en-US" sz="1200" kern="1200" dirty="0" smtClean="0">
+              <a:solidFill>
+                <a:schemeClr val="tx1"/>
+              </a:solidFill>
+              <a:effectLst/>
+              <a:latin typeface="+mn-lt"/>
+              <a:ea typeface="+mn-ea"/>
+              <a:cs typeface="+mn-cs"/>
+            </a:endParaRPr>
           </a:p>
           <a:p>
             <a:endParaRPr lang="en-US" dirty="0"/>
@@ -9291,7 +9658,31 @@
                 <a:ea typeface="+mn-ea"/>
                 <a:cs typeface="+mn-cs"/>
               </a:rPr>
-              <a:t>Since private keys are important, you need to take care when exposing them to theft or misuse. </a:t>
+              <a:t>Since private keys are important, </a:t>
+            </a:r>
+            <a:r>
+              <a:rPr lang="en-US" sz="1200" kern="1200" dirty="0" smtClean="0">
+                <a:solidFill>
+                  <a:schemeClr val="tx1"/>
+                </a:solidFill>
+                <a:effectLst/>
+                <a:latin typeface="+mn-lt"/>
+                <a:ea typeface="+mn-ea"/>
+                <a:cs typeface="+mn-cs"/>
+              </a:rPr>
+              <a:t>take </a:t>
+            </a:r>
+            <a:r>
+              <a:rPr lang="en-US" sz="1200" kern="1200" dirty="0" smtClean="0">
+                <a:solidFill>
+                  <a:schemeClr val="tx1"/>
+                </a:solidFill>
+                <a:effectLst/>
+                <a:latin typeface="+mn-lt"/>
+                <a:ea typeface="+mn-ea"/>
+                <a:cs typeface="+mn-cs"/>
+              </a:rPr>
+              <a:t>care when exposing them to theft or misuse. </a:t>
             </a:r>
           </a:p>
           <a:p>
@@ -9316,7 +9707,19 @@
                 <a:ea typeface="+mn-ea"/>
                 <a:cs typeface="+mn-cs"/>
               </a:rPr>
-              <a:t>The moment you store key in phone’s memory or in the </a:t>
+              <a:t>Storing in </a:t>
+            </a:r>
+            <a:r>
+              <a:rPr lang="en-US" sz="1200" kern="1200" dirty="0" smtClean="0">
+                <a:solidFill>
+                  <a:schemeClr val="tx1"/>
+                </a:solidFill>
+                <a:effectLst/>
+                <a:latin typeface="+mn-lt"/>
+                <a:ea typeface="+mn-ea"/>
+                <a:cs typeface="+mn-cs"/>
+              </a:rPr>
+              <a:t>phone’s memory or in </a:t>
             </a:r>
             <a:r>
               <a:rPr lang="en-US" sz="1200" kern="1200" dirty="0" err="1" smtClean="0">
@@ -9340,7 +9743,7 @@
                 <a:ea typeface="+mn-ea"/>
                 <a:cs typeface="+mn-cs"/>
               </a:rPr>
-              <a:t> of some browser you </a:t>
+              <a:t> </a:t>
             </a:r>
             <a:r>
               <a:rPr lang="en-US" sz="1200" b="1" kern="1200" dirty="0" smtClean="0">
@@ -9352,19 +9755,55 @@
                 <a:ea typeface="+mn-ea"/>
                 <a:cs typeface="+mn-cs"/>
               </a:rPr>
-              <a:t>creating the possibility</a:t>
-            </a:r>
-            <a:r>
-              <a:rPr lang="en-US" sz="1200" kern="1200" dirty="0" smtClean="0">
-                <a:solidFill>
-                  <a:schemeClr val="tx1"/>
-                </a:solidFill>
-                <a:effectLst/>
-                <a:latin typeface="+mn-lt"/>
-                <a:ea typeface="+mn-ea"/>
-                <a:cs typeface="+mn-cs"/>
-              </a:rPr>
-              <a:t> that it might get leaked or stolen.</a:t>
+              <a:t>creates the </a:t>
+            </a:r>
+            <a:r>
+              <a:rPr lang="en-US" sz="1200" b="1" kern="1200" dirty="0" smtClean="0">
+                <a:solidFill>
+                  <a:schemeClr val="tx1"/>
+                </a:solidFill>
+                <a:effectLst/>
+                <a:latin typeface="+mn-lt"/>
+                <a:ea typeface="+mn-ea"/>
+                <a:cs typeface="+mn-cs"/>
+              </a:rPr>
+              <a:t>possibility</a:t>
+            </a:r>
+            <a:r>
+              <a:rPr lang="en-US" sz="1200" kern="1200" dirty="0" smtClean="0">
+                <a:solidFill>
+                  <a:schemeClr val="tx1"/>
+                </a:solidFill>
+                <a:effectLst/>
+                <a:latin typeface="+mn-lt"/>
+                <a:ea typeface="+mn-ea"/>
+                <a:cs typeface="+mn-cs"/>
+              </a:rPr>
+              <a:t> </a:t>
+            </a:r>
+            <a:r>
+              <a:rPr lang="en-US" sz="1200" kern="1200" dirty="0" smtClean="0">
+                <a:solidFill>
+                  <a:schemeClr val="tx1"/>
+                </a:solidFill>
+                <a:effectLst/>
+                <a:latin typeface="+mn-lt"/>
+                <a:ea typeface="+mn-ea"/>
+                <a:cs typeface="+mn-cs"/>
+              </a:rPr>
+              <a:t>it </a:t>
+            </a:r>
+            <a:r>
+              <a:rPr lang="en-US" sz="1200" kern="1200" dirty="0" smtClean="0">
+                <a:solidFill>
+                  <a:schemeClr val="tx1"/>
+                </a:solidFill>
+                <a:effectLst/>
+                <a:latin typeface="+mn-lt"/>
+                <a:ea typeface="+mn-ea"/>
+                <a:cs typeface="+mn-cs"/>
+              </a:rPr>
+              <a:t>might get leaked or stolen.</a:t>
             </a:r>
           </a:p>
           <a:p>
@@ -9413,7 +9852,19 @@
                 <a:ea typeface="+mn-ea"/>
                 <a:cs typeface="+mn-cs"/>
               </a:rPr>
-              <a:t>keys for mobile app and JS clients that expire after a set period of time. This limits the window of opportunity for any attack made with compromised keys.</a:t>
+              <a:t>keys for mobile app and JS clients that expire after a set period of time. This limits the window of opportunity for any attack made with compromised keys</a:t>
+            </a:r>
+            <a:r>
+              <a:rPr lang="en-US" sz="1200" kern="1200" dirty="0" smtClean="0">
+                <a:solidFill>
+                  <a:schemeClr val="tx1"/>
+                </a:solidFill>
+                <a:effectLst/>
+                <a:latin typeface="+mn-lt"/>
+                <a:ea typeface="+mn-ea"/>
+                <a:cs typeface="+mn-cs"/>
+              </a:rPr>
+              <a:t>.</a:t>
             </a:r>
           </a:p>
           <a:p>
@@ -9438,7 +9889,44 @@
                 <a:ea typeface="+mn-ea"/>
                 <a:cs typeface="+mn-cs"/>
               </a:rPr>
-              <a:t>You also want to make sure to </a:t>
+              <a:t>(Example)</a:t>
+            </a:r>
+          </a:p>
+          <a:p>
+            <a:endParaRPr lang="en-US" sz="1200" kern="1200" dirty="0" smtClean="0">
+              <a:solidFill>
+                <a:schemeClr val="tx1"/>
+              </a:solidFill>
+              <a:effectLst/>
+              <a:latin typeface="+mn-lt"/>
+              <a:ea typeface="+mn-ea"/>
+              <a:cs typeface="+mn-cs"/>
+            </a:endParaRPr>
+          </a:p>
+          <a:p>
+            <a:r>
+              <a:rPr lang="en-US" sz="1200" kern="1200" dirty="0" smtClean="0">
+                <a:solidFill>
+                  <a:schemeClr val="tx1"/>
+                </a:solidFill>
+                <a:effectLst/>
+                <a:latin typeface="+mn-lt"/>
+                <a:ea typeface="+mn-ea"/>
+                <a:cs typeface="+mn-cs"/>
+              </a:rPr>
+              <a:t>Be sure </a:t>
+            </a:r>
+            <a:r>
+              <a:rPr lang="en-US" sz="1200" kern="1200" dirty="0" smtClean="0">
+                <a:solidFill>
+                  <a:schemeClr val="tx1"/>
+                </a:solidFill>
+                <a:effectLst/>
+                <a:latin typeface="+mn-lt"/>
+                <a:ea typeface="+mn-ea"/>
+                <a:cs typeface="+mn-cs"/>
+              </a:rPr>
+              <a:t>to </a:t>
             </a:r>
             <a:r>
               <a:rPr lang="en-US" sz="1200" b="1" kern="1200" dirty="0" smtClean="0">
@@ -9474,7 +9962,7 @@
                 <a:ea typeface="+mn-ea"/>
                 <a:cs typeface="+mn-cs"/>
               </a:rPr>
-              <a:t> we used a persistent, long-lived key that was still usable after the user’s session expired. If you create a temporary key when the user logs in, make damn sure it stops working when they log out.</a:t>
+              <a:t> we used a persistent, long-lived key that was still usable after the user’s session expired. </a:t>
             </a:r>
             <a:endParaRPr lang="en-US" dirty="0"/>
           </a:p>
@@ -9812,8 +10300,31 @@
                 <a:ea typeface="+mn-ea"/>
                 <a:cs typeface="+mn-cs"/>
               </a:rPr>
-              <a:t>We just covered a lot of ground, so let’s do a quick recap of API-key based authentication.</a:t>
-            </a:r>
+              <a:t>We just covered a lot of ground, so let’s do a quick recap of API-key based authentication</a:t>
+            </a:r>
+            <a:r>
+              <a:rPr lang="en-US" sz="1200" kern="1200" dirty="0" smtClean="0">
+                <a:solidFill>
+                  <a:schemeClr val="tx1"/>
+                </a:solidFill>
+                <a:effectLst/>
+                <a:latin typeface="+mn-lt"/>
+                <a:ea typeface="+mn-ea"/>
+                <a:cs typeface="+mn-cs"/>
+              </a:rPr>
+              <a:t>.</a:t>
+            </a:r>
+          </a:p>
+          <a:p>
+            <a:endParaRPr lang="en-US" sz="1200" kern="1200" dirty="0" smtClean="0">
+              <a:solidFill>
+                <a:schemeClr val="tx1"/>
+              </a:solidFill>
+              <a:effectLst/>
+              <a:latin typeface="+mn-lt"/>
+              <a:ea typeface="+mn-ea"/>
+              <a:cs typeface="+mn-cs"/>
+            </a:endParaRPr>
           </a:p>
           <a:p>
             <a:pPr lvl="0"/>
@@ -9827,7 +10338,55 @@
                 <a:ea typeface="+mn-ea"/>
                 <a:cs typeface="+mn-cs"/>
               </a:rPr>
-              <a:t>API Keys are used instead of usernames/passwords when accessing secure resources. They uniquely identify a specific user and are sometimes associated with specific permissions</a:t>
+              <a:t>* used </a:t>
+            </a:r>
+            <a:r>
+              <a:rPr lang="en-US" sz="1200" kern="1200" dirty="0" smtClean="0">
+                <a:solidFill>
+                  <a:schemeClr val="tx1"/>
+                </a:solidFill>
+                <a:effectLst/>
+                <a:latin typeface="+mn-lt"/>
+                <a:ea typeface="+mn-ea"/>
+                <a:cs typeface="+mn-cs"/>
+              </a:rPr>
+              <a:t>instead of usernames/passwords </a:t>
+            </a:r>
+            <a:endParaRPr lang="en-US" sz="1200" kern="1200" dirty="0" smtClean="0">
+              <a:solidFill>
+                <a:schemeClr val="tx1"/>
+              </a:solidFill>
+              <a:effectLst/>
+              <a:latin typeface="+mn-lt"/>
+              <a:ea typeface="+mn-ea"/>
+              <a:cs typeface="+mn-cs"/>
+            </a:endParaRPr>
+          </a:p>
+          <a:p>
+            <a:pPr lvl="0"/>
+            <a:r>
+              <a:rPr lang="en-US" sz="1200" kern="1200" dirty="0" smtClean="0">
+                <a:solidFill>
+                  <a:schemeClr val="tx1"/>
+                </a:solidFill>
+                <a:effectLst/>
+                <a:latin typeface="+mn-lt"/>
+                <a:ea typeface="+mn-ea"/>
+                <a:cs typeface="+mn-cs"/>
+              </a:rPr>
+              <a:t>* uniquely </a:t>
+            </a:r>
+            <a:r>
+              <a:rPr lang="en-US" sz="1200" kern="1200" dirty="0" smtClean="0">
+                <a:solidFill>
+                  <a:schemeClr val="tx1"/>
+                </a:solidFill>
+                <a:effectLst/>
+                <a:latin typeface="+mn-lt"/>
+                <a:ea typeface="+mn-ea"/>
+                <a:cs typeface="+mn-cs"/>
+              </a:rPr>
+              <a:t>identify a specific user and are sometimes associated with specific permissions</a:t>
             </a:r>
             <a:br>
               <a:rPr lang="en-US" sz="1200" kern="1200" dirty="0" smtClean="0">
@@ -9862,7 +10421,226 @@
                 <a:ea typeface="+mn-ea"/>
                 <a:cs typeface="+mn-cs"/>
               </a:rPr>
-              <a:t>When used like a password, the API Key is passed in a URL parameter or a header with each request to identify the requestor to the server. The requests MUST use SSL to protect the key in transit and the server SHOULD store the keys in a secure fashion. </a:t>
+              <a:t>When used like a password, </a:t>
+            </a:r>
+            <a:endParaRPr lang="en-US" sz="1200" kern="1200" dirty="0" smtClean="0">
+              <a:solidFill>
+                <a:schemeClr val="tx1"/>
+              </a:solidFill>
+              <a:effectLst/>
+              <a:latin typeface="+mn-lt"/>
+              <a:ea typeface="+mn-ea"/>
+              <a:cs typeface="+mn-cs"/>
+            </a:endParaRPr>
+          </a:p>
+          <a:p>
+            <a:pPr lvl="0"/>
+            <a:r>
+              <a:rPr lang="en-US" sz="1200" kern="1200" dirty="0" smtClean="0">
+                <a:solidFill>
+                  <a:schemeClr val="tx1"/>
+                </a:solidFill>
+                <a:effectLst/>
+                <a:latin typeface="+mn-lt"/>
+                <a:ea typeface="+mn-ea"/>
+                <a:cs typeface="+mn-cs"/>
+              </a:rPr>
+              <a:t>* the </a:t>
+            </a:r>
+            <a:r>
+              <a:rPr lang="en-US" sz="1200" kern="1200" dirty="0" smtClean="0">
+                <a:solidFill>
+                  <a:schemeClr val="tx1"/>
+                </a:solidFill>
+                <a:effectLst/>
+                <a:latin typeface="+mn-lt"/>
+                <a:ea typeface="+mn-ea"/>
+                <a:cs typeface="+mn-cs"/>
+              </a:rPr>
+              <a:t>API Key is passed in a URL parameter or a header </a:t>
+            </a:r>
+            <a:r>
+              <a:rPr lang="en-US" sz="1200" kern="1200" dirty="0" smtClean="0">
+                <a:solidFill>
+                  <a:schemeClr val="tx1"/>
+                </a:solidFill>
+                <a:effectLst/>
+                <a:latin typeface="+mn-lt"/>
+                <a:ea typeface="+mn-ea"/>
+                <a:cs typeface="+mn-cs"/>
+              </a:rPr>
+              <a:t>w/ each </a:t>
+            </a:r>
+            <a:r>
+              <a:rPr lang="en-US" sz="1200" kern="1200" dirty="0" smtClean="0">
+                <a:solidFill>
+                  <a:schemeClr val="tx1"/>
+                </a:solidFill>
+                <a:effectLst/>
+                <a:latin typeface="+mn-lt"/>
+                <a:ea typeface="+mn-ea"/>
+                <a:cs typeface="+mn-cs"/>
+              </a:rPr>
+              <a:t>request </a:t>
+            </a:r>
+            <a:endParaRPr lang="en-US" sz="1200" kern="1200" dirty="0" smtClean="0">
+              <a:solidFill>
+                <a:schemeClr val="tx1"/>
+              </a:solidFill>
+              <a:effectLst/>
+              <a:latin typeface="+mn-lt"/>
+              <a:ea typeface="+mn-ea"/>
+              <a:cs typeface="+mn-cs"/>
+            </a:endParaRPr>
+          </a:p>
+          <a:p>
+            <a:pPr lvl="0"/>
+            <a:r>
+              <a:rPr lang="en-US" sz="1200" kern="1200" dirty="0" smtClean="0">
+                <a:solidFill>
+                  <a:schemeClr val="tx1"/>
+                </a:solidFill>
+                <a:effectLst/>
+                <a:latin typeface="+mn-lt"/>
+                <a:ea typeface="+mn-ea"/>
+                <a:cs typeface="+mn-cs"/>
+              </a:rPr>
+              <a:t>*</a:t>
+            </a:r>
+            <a:r>
+              <a:rPr lang="en-US" sz="1200" kern="1200" baseline="0" dirty="0" smtClean="0">
+                <a:solidFill>
+                  <a:schemeClr val="tx1"/>
+                </a:solidFill>
+                <a:effectLst/>
+                <a:latin typeface="+mn-lt"/>
+                <a:ea typeface="+mn-ea"/>
+                <a:cs typeface="+mn-cs"/>
+              </a:rPr>
+              <a:t> </a:t>
+            </a:r>
+            <a:r>
+              <a:rPr lang="en-US" sz="1200" kern="1200" dirty="0" smtClean="0">
+                <a:solidFill>
+                  <a:schemeClr val="tx1"/>
+                </a:solidFill>
+                <a:effectLst/>
+                <a:latin typeface="+mn-lt"/>
+                <a:ea typeface="+mn-ea"/>
+                <a:cs typeface="+mn-cs"/>
+              </a:rPr>
+              <a:t>requests </a:t>
+            </a:r>
+            <a:r>
+              <a:rPr lang="en-US" sz="1200" kern="1200" dirty="0" smtClean="0">
+                <a:solidFill>
+                  <a:schemeClr val="tx1"/>
+                </a:solidFill>
+                <a:effectLst/>
+                <a:latin typeface="+mn-lt"/>
+                <a:ea typeface="+mn-ea"/>
+                <a:cs typeface="+mn-cs"/>
+              </a:rPr>
+              <a:t>MUST use SSL to protect the key in transit </a:t>
+            </a:r>
+            <a:endParaRPr lang="en-US" sz="1200" kern="1200" dirty="0" smtClean="0">
+              <a:solidFill>
+                <a:schemeClr val="tx1"/>
+              </a:solidFill>
+              <a:effectLst/>
+              <a:latin typeface="+mn-lt"/>
+              <a:ea typeface="+mn-ea"/>
+              <a:cs typeface="+mn-cs"/>
+            </a:endParaRPr>
+          </a:p>
+          <a:p>
+            <a:pPr lvl="0"/>
+            <a:r>
+              <a:rPr lang="en-US" sz="1200" kern="1200" dirty="0" smtClean="0">
+                <a:solidFill>
+                  <a:schemeClr val="tx1"/>
+                </a:solidFill>
+                <a:effectLst/>
+                <a:latin typeface="+mn-lt"/>
+                <a:ea typeface="+mn-ea"/>
+                <a:cs typeface="+mn-cs"/>
+              </a:rPr>
+              <a:t>* server </a:t>
+            </a:r>
+            <a:r>
+              <a:rPr lang="en-US" sz="1200" kern="1200" dirty="0" smtClean="0">
+                <a:solidFill>
+                  <a:schemeClr val="tx1"/>
+                </a:solidFill>
+                <a:effectLst/>
+                <a:latin typeface="+mn-lt"/>
+                <a:ea typeface="+mn-ea"/>
+                <a:cs typeface="+mn-cs"/>
+              </a:rPr>
+              <a:t>SHOULD store the keys in a secure </a:t>
+            </a:r>
+            <a:r>
+              <a:rPr lang="en-US" sz="1200" kern="1200" dirty="0" smtClean="0">
+                <a:solidFill>
+                  <a:schemeClr val="tx1"/>
+                </a:solidFill>
+                <a:effectLst/>
+                <a:latin typeface="+mn-lt"/>
+                <a:ea typeface="+mn-ea"/>
+                <a:cs typeface="+mn-cs"/>
+              </a:rPr>
+              <a:t>fashion</a:t>
+            </a:r>
+          </a:p>
+          <a:p>
+            <a:pPr lvl="0"/>
+            <a:r>
+              <a:rPr lang="en-US" sz="1200" kern="1200" dirty="0" smtClean="0">
+                <a:solidFill>
+                  <a:schemeClr val="tx1"/>
+                </a:solidFill>
+                <a:effectLst/>
+                <a:latin typeface="+mn-lt"/>
+                <a:ea typeface="+mn-ea"/>
+                <a:cs typeface="+mn-cs"/>
+              </a:rPr>
+              <a:t>* No</a:t>
+            </a:r>
+            <a:r>
+              <a:rPr lang="en-US" sz="1200" kern="1200" baseline="0" dirty="0" smtClean="0">
+                <a:solidFill>
+                  <a:schemeClr val="tx1"/>
+                </a:solidFill>
+                <a:effectLst/>
+                <a:latin typeface="+mn-lt"/>
+                <a:ea typeface="+mn-ea"/>
+                <a:cs typeface="+mn-cs"/>
+              </a:rPr>
+              <a:t> way to verify message integrity</a:t>
+            </a:r>
+            <a:r>
+              <a:rPr lang="en-US" sz="1200" kern="1200" dirty="0" smtClean="0">
+                <a:solidFill>
+                  <a:schemeClr val="tx1"/>
+                </a:solidFill>
+                <a:effectLst/>
+                <a:latin typeface="+mn-lt"/>
+                <a:ea typeface="+mn-ea"/>
+                <a:cs typeface="+mn-cs"/>
+              </a:rPr>
+              <a:t> </a:t>
+            </a:r>
+            <a:r>
+              <a:rPr lang="en-US" sz="1200" kern="1200" dirty="0" smtClean="0">
+                <a:solidFill>
+                  <a:schemeClr val="tx1"/>
+                </a:solidFill>
+                <a:effectLst/>
+                <a:latin typeface="+mn-lt"/>
+                <a:ea typeface="+mn-ea"/>
+                <a:cs typeface="+mn-cs"/>
+              </a:rPr>
+              <a:t/>
             </a:r>
             <a:br>
               <a:rPr lang="en-US" sz="1200" kern="1200" dirty="0" smtClean="0">
@@ -10008,8 +10786,41 @@
                 <a:ea typeface="+mn-ea"/>
                 <a:cs typeface="+mn-cs"/>
               </a:rPr>
-              <a:t>When API Keys are used as a cryptographic key to sign requests then each public API Key must be paired with a private key that is kept secure. </a:t>
-            </a:r>
+              <a:t>When API Keys are used </a:t>
+            </a:r>
+            <a:r>
+              <a:rPr lang="en-US" sz="1200" kern="1200" dirty="0" smtClean="0">
+                <a:solidFill>
+                  <a:schemeClr val="tx1"/>
+                </a:solidFill>
+                <a:effectLst/>
+                <a:latin typeface="+mn-lt"/>
+                <a:ea typeface="+mn-ea"/>
+                <a:cs typeface="+mn-cs"/>
+              </a:rPr>
+              <a:t>to </a:t>
+            </a:r>
+            <a:r>
+              <a:rPr lang="en-US" sz="1200" kern="1200" dirty="0" smtClean="0">
+                <a:solidFill>
+                  <a:schemeClr val="tx1"/>
+                </a:solidFill>
+                <a:effectLst/>
+                <a:latin typeface="+mn-lt"/>
+                <a:ea typeface="+mn-ea"/>
+                <a:cs typeface="+mn-cs"/>
+              </a:rPr>
+              <a:t>sign requests </a:t>
+            </a:r>
+            <a:endParaRPr lang="en-US" sz="1200" kern="1200" dirty="0" smtClean="0">
+              <a:solidFill>
+                <a:schemeClr val="tx1"/>
+              </a:solidFill>
+              <a:effectLst/>
+              <a:latin typeface="+mn-lt"/>
+              <a:ea typeface="+mn-ea"/>
+              <a:cs typeface="+mn-cs"/>
+            </a:endParaRPr>
           </a:p>
           <a:p>
             <a:pPr marL="0" marR="0" lvl="0" indent="0" algn="l" defTabSz="914400" rtl="0" eaLnBrk="1" fontAlgn="auto" latinLnBrk="0" hangingPunct="1">
@@ -10029,15 +10840,66 @@
               <a:tabLst/>
               <a:defRPr/>
             </a:pPr>
-            <a:endParaRPr lang="en-US" sz="1200" kern="1200" dirty="0" smtClean="0">
-              <a:solidFill>
-                <a:schemeClr val="tx1"/>
-              </a:solidFill>
-              <a:effectLst/>
-              <a:latin typeface="+mn-lt"/>
-              <a:ea typeface="+mn-ea"/>
-              <a:cs typeface="+mn-cs"/>
-            </a:endParaRPr>
+            <a:r>
+              <a:rPr lang="en-US" sz="1200" kern="1200" dirty="0" smtClean="0">
+                <a:solidFill>
+                  <a:schemeClr val="tx1"/>
+                </a:solidFill>
+                <a:effectLst/>
+                <a:latin typeface="+mn-lt"/>
+                <a:ea typeface="+mn-ea"/>
+                <a:cs typeface="+mn-cs"/>
+              </a:rPr>
+              <a:t>*</a:t>
+            </a:r>
+            <a:r>
+              <a:rPr lang="en-US" sz="1200" kern="1200" baseline="0" dirty="0" smtClean="0">
+                <a:solidFill>
+                  <a:schemeClr val="tx1"/>
+                </a:solidFill>
+                <a:effectLst/>
+                <a:latin typeface="+mn-lt"/>
+                <a:ea typeface="+mn-ea"/>
+                <a:cs typeface="+mn-cs"/>
+              </a:rPr>
+              <a:t> </a:t>
+            </a:r>
+            <a:r>
+              <a:rPr lang="en-US" sz="1200" kern="1200" dirty="0" smtClean="0">
+                <a:solidFill>
+                  <a:schemeClr val="tx1"/>
+                </a:solidFill>
+                <a:effectLst/>
+                <a:latin typeface="+mn-lt"/>
+                <a:ea typeface="+mn-ea"/>
+                <a:cs typeface="+mn-cs"/>
+              </a:rPr>
+              <a:t>each </a:t>
+            </a:r>
+            <a:r>
+              <a:rPr lang="en-US" sz="1200" kern="1200" dirty="0" smtClean="0">
+                <a:solidFill>
+                  <a:schemeClr val="tx1"/>
+                </a:solidFill>
+                <a:effectLst/>
+                <a:latin typeface="+mn-lt"/>
+                <a:ea typeface="+mn-ea"/>
+                <a:cs typeface="+mn-cs"/>
+              </a:rPr>
+              <a:t>public API Key must be paired with a private key that is kept </a:t>
+            </a:r>
+            <a:r>
+              <a:rPr lang="en-US" sz="1200" kern="1200" dirty="0" smtClean="0">
+                <a:solidFill>
+                  <a:schemeClr val="tx1"/>
+                </a:solidFill>
+                <a:effectLst/>
+                <a:latin typeface="+mn-lt"/>
+                <a:ea typeface="+mn-ea"/>
+                <a:cs typeface="+mn-cs"/>
+              </a:rPr>
+              <a:t>secure</a:t>
+            </a:r>
           </a:p>
           <a:p>
             <a:pPr marL="0" marR="0" lvl="0" indent="0" algn="l" defTabSz="914400" rtl="0" eaLnBrk="1" fontAlgn="auto" latinLnBrk="0" hangingPunct="1">
@@ -10067,7 +10929,19 @@
                 <a:ea typeface="+mn-ea"/>
                 <a:cs typeface="+mn-cs"/>
               </a:rPr>
-              <a:t>Private keys must be stored on the server as text or using reversible encryption. </a:t>
+              <a:t>* Private</a:t>
+            </a:r>
+            <a:r>
+              <a:rPr lang="en-US" sz="1200" kern="1200" baseline="0" dirty="0" smtClean="0">
+                <a:solidFill>
+                  <a:schemeClr val="tx1"/>
+                </a:solidFill>
+                <a:effectLst/>
+                <a:latin typeface="+mn-lt"/>
+                <a:ea typeface="+mn-ea"/>
+                <a:cs typeface="+mn-cs"/>
+              </a:rPr>
+              <a:t> keys must be stored as text or reversible encryption</a:t>
             </a:r>
           </a:p>
           <a:p>
@@ -10088,15 +10962,30 @@
               <a:tabLst/>
               <a:defRPr/>
             </a:pPr>
-            <a:endParaRPr lang="en-US" sz="1200" kern="1200" dirty="0" smtClean="0">
-              <a:solidFill>
-                <a:schemeClr val="tx1"/>
-              </a:solidFill>
-              <a:effectLst/>
-              <a:latin typeface="+mn-lt"/>
-              <a:ea typeface="+mn-ea"/>
-              <a:cs typeface="+mn-cs"/>
-            </a:endParaRPr>
+            <a:r>
+              <a:rPr lang="en-US" sz="1200" kern="1200" dirty="0" smtClean="0">
+                <a:solidFill>
+                  <a:schemeClr val="tx1"/>
+                </a:solidFill>
+                <a:effectLst/>
+                <a:latin typeface="+mn-lt"/>
+                <a:ea typeface="+mn-ea"/>
+                <a:cs typeface="+mn-cs"/>
+              </a:rPr>
+              <a:t>*</a:t>
+            </a:r>
+            <a:r>
+              <a:rPr lang="en-US" sz="1200" kern="1200" baseline="0" dirty="0" smtClean="0">
+                <a:solidFill>
+                  <a:schemeClr val="tx1"/>
+                </a:solidFill>
+                <a:effectLst/>
+                <a:latin typeface="+mn-lt"/>
+                <a:ea typeface="+mn-ea"/>
+                <a:cs typeface="+mn-cs"/>
+              </a:rPr>
+              <a:t> Does not require TLS, unless the API call itself is sensitive</a:t>
+            </a:r>
           </a:p>
           <a:p>
             <a:pPr marL="0" marR="0" lvl="0" indent="0" algn="l" defTabSz="914400" rtl="0" eaLnBrk="1" fontAlgn="auto" latinLnBrk="0" hangingPunct="1">
@@ -10126,8 +11015,17 @@
                 <a:ea typeface="+mn-ea"/>
                 <a:cs typeface="+mn-cs"/>
               </a:rPr>
-              <a:t>Signing requests allows us to verify identity without requiring TLS &amp; gives us message integrity</a:t>
-            </a:r>
+              <a:t>* Guarantees message was not modified in transit</a:t>
+            </a:r>
+            <a:endParaRPr lang="en-US" sz="1200" kern="1200" dirty="0" smtClean="0">
+              <a:solidFill>
+                <a:schemeClr val="tx1"/>
+              </a:solidFill>
+              <a:effectLst/>
+              <a:latin typeface="+mn-lt"/>
+              <a:ea typeface="+mn-ea"/>
+              <a:cs typeface="+mn-cs"/>
+            </a:endParaRPr>
           </a:p>
           <a:p>
             <a:endParaRPr lang="en-US" dirty="0"/>
@@ -15049,7 +15947,31 @@
                 <a:ea typeface="+mn-ea"/>
                 <a:cs typeface="+mn-cs"/>
               </a:rPr>
-              <a:t>In this scenario, Foo would be correct in considering that an authenticated user.</a:t>
+              <a:t>In this scenario, Foo would be correct in considering </a:t>
+            </a:r>
+            <a:r>
+              <a:rPr lang="en-US" sz="1200" kern="1200" dirty="0" smtClean="0">
+                <a:solidFill>
+                  <a:schemeClr val="tx1"/>
+                </a:solidFill>
+                <a:effectLst/>
+                <a:latin typeface="+mn-lt"/>
+                <a:ea typeface="+mn-ea"/>
+                <a:cs typeface="+mn-cs"/>
+              </a:rPr>
+              <a:t>me an </a:t>
+            </a:r>
+            <a:r>
+              <a:rPr lang="en-US" sz="1200" kern="1200" dirty="0" smtClean="0">
+                <a:solidFill>
+                  <a:schemeClr val="tx1"/>
+                </a:solidFill>
+                <a:effectLst/>
+                <a:latin typeface="+mn-lt"/>
+                <a:ea typeface="+mn-ea"/>
+                <a:cs typeface="+mn-cs"/>
+              </a:rPr>
+              <a:t>authenticated user.</a:t>
             </a:r>
           </a:p>
           <a:p>
@@ -15816,7 +16738,31 @@
                 <a:ea typeface="+mn-ea"/>
                 <a:cs typeface="+mn-cs"/>
               </a:rPr>
-              <a:t>Foo as authenticated as me</a:t>
+              <a:t>Foo </a:t>
+            </a:r>
+            <a:r>
+              <a:rPr lang="en-US" sz="1200" b="1" kern="1200" baseline="0" dirty="0" smtClean="0">
+                <a:solidFill>
+                  <a:schemeClr val="tx1"/>
+                </a:solidFill>
+                <a:effectLst/>
+                <a:latin typeface="+mn-lt"/>
+                <a:ea typeface="+mn-ea"/>
+                <a:cs typeface="+mn-cs"/>
+              </a:rPr>
+              <a:t>has </a:t>
+            </a:r>
+            <a:r>
+              <a:rPr lang="en-US" sz="1200" b="1" kern="1200" baseline="0" dirty="0" smtClean="0">
+                <a:solidFill>
+                  <a:schemeClr val="tx1"/>
+                </a:solidFill>
+                <a:effectLst/>
+                <a:latin typeface="+mn-lt"/>
+                <a:ea typeface="+mn-ea"/>
+                <a:cs typeface="+mn-cs"/>
+              </a:rPr>
+              <a:t>authenticated as me</a:t>
             </a:r>
             <a:r>
               <a:rPr lang="en-US" sz="1200" kern="1200" baseline="0" dirty="0" smtClean="0">
@@ -18605,68 +19551,6 @@
             </a:endParaRPr>
           </a:p>
           <a:p>
-            <a:r>
-              <a:rPr lang="en-US" sz="1200" kern="1200" dirty="0" smtClean="0">
-                <a:solidFill>
-                  <a:schemeClr val="tx1"/>
-                </a:solidFill>
-                <a:effectLst/>
-                <a:latin typeface="+mn-lt"/>
-                <a:ea typeface="+mn-ea"/>
-                <a:cs typeface="+mn-cs"/>
-              </a:rPr>
-              <a:t>Just like Basic </a:t>
-            </a:r>
-            <a:r>
-              <a:rPr lang="en-US" sz="1200" kern="1200" dirty="0" err="1" smtClean="0">
-                <a:solidFill>
-                  <a:schemeClr val="tx1"/>
-                </a:solidFill>
-                <a:effectLst/>
-                <a:latin typeface="+mn-lt"/>
-                <a:ea typeface="+mn-ea"/>
-                <a:cs typeface="+mn-cs"/>
-              </a:rPr>
-              <a:t>Auth</a:t>
-            </a:r>
-            <a:r>
-              <a:rPr lang="en-US" sz="1200" kern="1200" dirty="0" smtClean="0">
-                <a:solidFill>
-                  <a:schemeClr val="tx1"/>
-                </a:solidFill>
-                <a:effectLst/>
-                <a:latin typeface="+mn-lt"/>
-                <a:ea typeface="+mn-ea"/>
-                <a:cs typeface="+mn-cs"/>
-              </a:rPr>
-              <a:t>, this approach is </a:t>
-            </a:r>
-            <a:r>
-              <a:rPr lang="en-US" sz="1200" b="1" kern="1200" dirty="0" smtClean="0">
-                <a:solidFill>
-                  <a:schemeClr val="tx1"/>
-                </a:solidFill>
-                <a:effectLst/>
-                <a:latin typeface="+mn-lt"/>
-                <a:ea typeface="+mn-ea"/>
-                <a:cs typeface="+mn-cs"/>
-              </a:rPr>
-              <a:t>only as secure</a:t>
-            </a:r>
-            <a:r>
-              <a:rPr lang="en-US" sz="1200" kern="1200" dirty="0" smtClean="0">
-                <a:solidFill>
-                  <a:schemeClr val="tx1"/>
-                </a:solidFill>
-                <a:effectLst/>
-                <a:latin typeface="+mn-lt"/>
-                <a:ea typeface="+mn-ea"/>
-                <a:cs typeface="+mn-cs"/>
-              </a:rPr>
-              <a:t> as your use of TLS.</a:t>
-            </a:r>
-          </a:p>
-          <a:p>
             <a:endParaRPr lang="en-US" dirty="0"/>
           </a:p>
         </p:txBody>
@@ -18834,24 +19718,6 @@
               <a:ea typeface="+mn-ea"/>
               <a:cs typeface="+mn-cs"/>
             </a:endParaRPr>
-          </a:p>
-          <a:p>
-            <a:pPr marL="171450" indent="-171450">
-              <a:buFont typeface="Arial" panose="020B0604020202020204" pitchFamily="34" charset="0"/>
-              <a:buChar char="•"/>
-            </a:pPr>
-            <a:r>
-              <a:rPr lang="en-US" sz="1200" kern="1200" dirty="0" smtClean="0">
-                <a:solidFill>
-                  <a:schemeClr val="tx1"/>
-                </a:solidFill>
-                <a:effectLst/>
-                <a:latin typeface="+mn-lt"/>
-                <a:ea typeface="+mn-ea"/>
-                <a:cs typeface="+mn-cs"/>
-              </a:rPr>
-              <a:t>Provides message integrity </a:t>
-            </a:r>
           </a:p>
           <a:p>
             <a:pPr marL="171450" indent="-171450">
@@ -24829,7 +25695,7 @@
             </a:r>
             <a:r>
               <a:rPr lang="en-US" sz="4800" dirty="0" smtClean="0"/>
-              <a:t>“pick your path”</a:t>
+              <a:t>“narrow down the options”</a:t>
             </a:r>
             <a:endParaRPr lang="en-US" sz="4800" dirty="0"/>
           </a:p>
@@ -29094,8 +29960,13 @@
             </a:r>
             <a:r>
               <a:rPr lang="en-US" sz="3600" dirty="0" smtClean="0"/>
-              <a:t> use SSL </a:t>
-            </a:r>
+              <a:t> use </a:t>
+            </a:r>
+            <a:r>
+              <a:rPr lang="en-US" sz="3600" dirty="0" smtClean="0"/>
+              <a:t>TLS</a:t>
+            </a:r>
+            <a:endParaRPr lang="en-US" sz="3600" dirty="0" smtClean="0"/>
           </a:p>
           <a:p>
             <a:pPr lvl="1"/>
@@ -29418,7 +30289,11 @@
           <a:p>
             <a:r>
               <a:rPr lang="en-US" sz="4000" dirty="0" smtClean="0"/>
-              <a:t>HMAC is well suited for server to server API calls</a:t>
+              <a:t>API keys are great for </a:t>
+            </a:r>
+            <a:r>
+              <a:rPr lang="en-US" sz="4000" dirty="0" smtClean="0"/>
+              <a:t>server to server API calls</a:t>
             </a:r>
             <a:br>
               <a:rPr lang="en-US" sz="4000" dirty="0" smtClean="0"/>
@@ -29428,8 +30303,13 @@
           <a:p>
             <a:r>
               <a:rPr lang="en-US" sz="4000" dirty="0" smtClean="0"/>
-              <a:t>HMAC from JavaScript is doable, but consider temporary (expiring) API Keys</a:t>
-            </a:r>
+              <a:t>If using API keys in lieu of </a:t>
+            </a:r>
+            <a:r>
+              <a:rPr lang="en-US" sz="4000" dirty="0" err="1" smtClean="0"/>
+              <a:t>sess</a:t>
+            </a:r>
+            <a:endParaRPr lang="en-US" sz="4000" dirty="0" smtClean="0"/>
           </a:p>
           <a:p>
             <a:pPr lvl="1"/>
@@ -29477,11 +30357,11 @@
   <p:clrMapOvr>
     <a:masterClrMapping/>
   </p:clrMapOvr>
-  <mc:AlternateContent xmlns:mc="http://schemas.openxmlformats.org/markup-compatibility/2006" xmlns:p14="http://schemas.microsoft.com/office/powerpoint/2010/main">
-    <mc:Choice Requires="p14">
+  <mc:AlternateContent xmlns:mc="http://schemas.openxmlformats.org/markup-compatibility/2006">
+    <mc:Choice xmlns:p14="http://schemas.microsoft.com/office/powerpoint/2010/main" Requires="p14">
       <p:transition spd="slow" p14:dur="2000"/>
     </mc:Choice>
-    <mc:Fallback xmlns="">
+    <mc:Fallback>
       <p:transition spd="slow"/>
     </mc:Fallback>
   </mc:AlternateContent>

</xml_diff>

<commit_message>
More polish to closing
</commit_message>
<xml_diff>
--- a/Securing Your API Endpoints - CodeMash 2016.pptx
+++ b/Securing Your API Endpoints - CodeMash 2016.pptx
@@ -12752,24 +12752,6 @@
               <a:buFont typeface="Arial" panose="020B0604020202020204" pitchFamily="34" charset="0"/>
               <a:buChar char="•"/>
             </a:pPr>
-            <a:r>
-              <a:rPr lang="en-US" sz="1200" kern="1200" dirty="0" smtClean="0">
-                <a:solidFill>
-                  <a:schemeClr val="tx1"/>
-                </a:solidFill>
-                <a:effectLst/>
-                <a:latin typeface="+mn-lt"/>
-                <a:ea typeface="+mn-ea"/>
-                <a:cs typeface="+mn-cs"/>
-              </a:rPr>
-              <a:t>Message integrity is guaranteed</a:t>
-            </a:r>
-          </a:p>
-          <a:p>
-            <a:pPr marL="171450" indent="-171450">
-              <a:buFont typeface="Arial" panose="020B0604020202020204" pitchFamily="34" charset="0"/>
-              <a:buChar char="•"/>
-            </a:pPr>
             <a:endParaRPr lang="en-US" sz="1200" kern="1200" dirty="0" smtClean="0">
               <a:solidFill>
                 <a:schemeClr val="tx1"/>
@@ -20829,7 +20811,7 @@
                 <a:ea typeface="+mn-ea"/>
                 <a:cs typeface="+mn-cs"/>
               </a:rPr>
-              <a:t>Requests must use EITHER TLS, OR be signed with a MAC. If you’re passing sensitive data over the wire then use SSL. If you want to verify message integrity, use a MAC.</a:t>
+              <a:t>Requests must use EITHER TLS, OR be signed with a MAC. </a:t>
             </a:r>
           </a:p>
           <a:p>
@@ -20846,7 +20828,7 @@
                 <a:ea typeface="+mn-ea"/>
                 <a:cs typeface="+mn-cs"/>
               </a:rPr>
-              <a:t>If you own the data that your API deals with, or</a:t>
+              <a:t>If you’re</a:t>
             </a:r>
             <a:r>
               <a:rPr lang="en-US" sz="1200" kern="1200" baseline="0" dirty="0" smtClean="0">
@@ -20858,19 +20840,19 @@
                 <a:ea typeface="+mn-ea"/>
                 <a:cs typeface="+mn-cs"/>
               </a:rPr>
-              <a:t> if you’re writing the server AND the client yourself, then custom API keys may be simpler </a:t>
-            </a:r>
-            <a:r>
-              <a:rPr lang="en-US" sz="1200" kern="1200" dirty="0" smtClean="0">
-                <a:solidFill>
-                  <a:schemeClr val="tx1"/>
-                </a:solidFill>
-                <a:effectLst/>
-                <a:latin typeface="+mn-lt"/>
-                <a:ea typeface="+mn-ea"/>
-                <a:cs typeface="+mn-cs"/>
-              </a:rPr>
-              <a:t>than using OAuth. You</a:t>
+              <a:t> not dealing with 3</a:t>
+            </a:r>
+            <a:r>
+              <a:rPr lang="en-US" sz="1200" kern="1200" baseline="30000" dirty="0" smtClean="0">
+                <a:solidFill>
+                  <a:schemeClr val="tx1"/>
+                </a:solidFill>
+                <a:effectLst/>
+                <a:latin typeface="+mn-lt"/>
+                <a:ea typeface="+mn-ea"/>
+                <a:cs typeface="+mn-cs"/>
+              </a:rPr>
+              <a:t>rd</a:t>
             </a:r>
             <a:r>
               <a:rPr lang="en-US" sz="1200" kern="1200" baseline="0" dirty="0" smtClean="0">
@@ -20882,7 +20864,91 @@
                 <a:ea typeface="+mn-ea"/>
                 <a:cs typeface="+mn-cs"/>
               </a:rPr>
-              <a:t> can use API keys as bearer tokens or to sign requests, depending on your needs.</a:t>
+              <a:t> party data or services, it will probably be simpler to use </a:t>
+            </a:r>
+            <a:r>
+              <a:rPr lang="en-US" sz="1200" kern="1200" dirty="0" smtClean="0">
+                <a:solidFill>
+                  <a:schemeClr val="tx1"/>
+                </a:solidFill>
+                <a:effectLst/>
+                <a:latin typeface="+mn-lt"/>
+                <a:ea typeface="+mn-ea"/>
+                <a:cs typeface="+mn-cs"/>
+              </a:rPr>
+              <a:t>API keys</a:t>
+            </a:r>
+            <a:r>
+              <a:rPr lang="en-US" sz="1200" kern="1200" baseline="0" dirty="0" smtClean="0">
+                <a:solidFill>
+                  <a:schemeClr val="tx1"/>
+                </a:solidFill>
+                <a:effectLst/>
+                <a:latin typeface="+mn-lt"/>
+                <a:ea typeface="+mn-ea"/>
+                <a:cs typeface="+mn-cs"/>
+              </a:rPr>
+              <a:t> instead of </a:t>
+            </a:r>
+            <a:r>
+              <a:rPr lang="en-US" sz="1200" kern="1200" baseline="0" dirty="0" err="1" smtClean="0">
+                <a:solidFill>
+                  <a:schemeClr val="tx1"/>
+                </a:solidFill>
+                <a:effectLst/>
+                <a:latin typeface="+mn-lt"/>
+                <a:ea typeface="+mn-ea"/>
+                <a:cs typeface="+mn-cs"/>
+              </a:rPr>
+              <a:t>Oauth</a:t>
+            </a:r>
+            <a:r>
+              <a:rPr lang="en-US" sz="1200" kern="1200" baseline="0" dirty="0" smtClean="0">
+                <a:solidFill>
+                  <a:schemeClr val="tx1"/>
+                </a:solidFill>
+                <a:effectLst/>
+                <a:latin typeface="+mn-lt"/>
+                <a:ea typeface="+mn-ea"/>
+                <a:cs typeface="+mn-cs"/>
+              </a:rPr>
+              <a:t>. </a:t>
+            </a:r>
+            <a:r>
+              <a:rPr lang="en-US" sz="1200" kern="1200" dirty="0" smtClean="0">
+                <a:solidFill>
+                  <a:schemeClr val="tx1"/>
+                </a:solidFill>
+                <a:effectLst/>
+                <a:latin typeface="+mn-lt"/>
+                <a:ea typeface="+mn-ea"/>
+                <a:cs typeface="+mn-cs"/>
+              </a:rPr>
+              <a:t>You</a:t>
+            </a:r>
+            <a:r>
+              <a:rPr lang="en-US" sz="1200" kern="1200" baseline="0" dirty="0" smtClean="0">
+                <a:solidFill>
+                  <a:schemeClr val="tx1"/>
+                </a:solidFill>
+                <a:effectLst/>
+                <a:latin typeface="+mn-lt"/>
+                <a:ea typeface="+mn-ea"/>
+                <a:cs typeface="+mn-cs"/>
+              </a:rPr>
+              <a:t> </a:t>
+            </a:r>
+            <a:r>
+              <a:rPr lang="en-US" sz="1200" kern="1200" baseline="0" dirty="0" smtClean="0">
+                <a:solidFill>
+                  <a:schemeClr val="tx1"/>
+                </a:solidFill>
+                <a:effectLst/>
+                <a:latin typeface="+mn-lt"/>
+                <a:ea typeface="+mn-ea"/>
+                <a:cs typeface="+mn-cs"/>
+              </a:rPr>
+              <a:t>can use API keys as bearer tokens or to sign requests, depending on your needs.</a:t>
             </a:r>
           </a:p>
           <a:p>
@@ -30711,12 +30777,17 @@
             </a:r>
             <a:r>
               <a:rPr lang="en-US" sz="3200" dirty="0" smtClean="0"/>
-              <a:t>TLS not req. / integrity guaranteed</a:t>
-            </a:r>
-            <a:r>
-              <a:rPr lang="en-US" sz="4000" dirty="0" smtClean="0"/>
-              <a:t>)</a:t>
-            </a:r>
+              <a:t>TLS not </a:t>
+            </a:r>
+            <a:r>
+              <a:rPr lang="en-US" sz="3200" dirty="0" smtClean="0"/>
+              <a:t>req</a:t>
+            </a:r>
+            <a:r>
+              <a:rPr lang="en-US" sz="3200" dirty="0" smtClean="0"/>
+              <a:t>uired)</a:t>
+            </a:r>
+            <a:endParaRPr lang="en-US" sz="4000" dirty="0" smtClean="0"/>
           </a:p>
           <a:p>
             <a:endParaRPr lang="en-US" sz="4000" dirty="0" smtClean="0"/>
@@ -34776,25 +34847,24 @@
           <a:p>
             <a:r>
               <a:rPr lang="en-US" sz="4000" dirty="0" smtClean="0"/>
-              <a:t>If you are authenticating against </a:t>
-            </a:r>
-            <a:r>
-              <a:rPr lang="en-US" sz="4000" b="1" dirty="0" smtClean="0"/>
-              <a:t>your</a:t>
+              <a:t>If </a:t>
             </a:r>
             <a:r>
               <a:rPr lang="en-US" sz="4000" dirty="0" smtClean="0"/>
-              <a:t> </a:t>
-            </a:r>
-            <a:r>
-              <a:rPr lang="en-US" sz="4000" b="1" dirty="0" smtClean="0"/>
-              <a:t>data</a:t>
-            </a:r>
-            <a:r>
-              <a:rPr lang="en-US" sz="4000" smtClean="0"/>
-              <a:t>, consider API Keys</a:t>
-            </a:r>
-            <a:endParaRPr lang="en-US" sz="4000" dirty="0" smtClean="0"/>
+              <a:t>you’re not using 3</a:t>
+            </a:r>
+            <a:r>
+              <a:rPr lang="en-US" sz="4000" baseline="30000" dirty="0" smtClean="0"/>
+              <a:t>rd</a:t>
+            </a:r>
+            <a:r>
+              <a:rPr lang="en-US" sz="4000" dirty="0" smtClean="0"/>
+              <a:t> party data, use API </a:t>
+            </a:r>
+            <a:r>
+              <a:rPr lang="en-US" sz="4000" dirty="0" smtClean="0"/>
+              <a:t>Keys</a:t>
+            </a:r>
           </a:p>
           <a:p>
             <a:endParaRPr lang="en-US" sz="4000" dirty="0" smtClean="0"/>

</xml_diff>